<commit_message>
use Title and Chart slide layout
</commit_message>
<xml_diff>
--- a/doc/template.pptx
+++ b/doc/template.pptx
@@ -307,7 +307,7 @@
           <a:p>
             <a:fld id="{1ED6B14A-890B-41B1-BF8F-0DE335D705D5}" type="datetimeFigureOut">
               <a:rPr lang="en-US" smtClean="0"/>
-              <a:t>7/29/2019</a:t>
+              <a:t>1/13/2022</a:t>
             </a:fld>
             <a:endParaRPr lang="en-US"/>
           </a:p>
@@ -369,6 +369,263 @@
 </file>
 
 <file path=ppt/slideLayouts/slideLayout10.xml><?xml version="1.0" encoding="utf-8"?>
+<p:sldLayout xmlns:a="http://schemas.openxmlformats.org/drawingml/2006/main" xmlns:r="http://schemas.openxmlformats.org/officeDocument/2006/relationships" xmlns:p="http://schemas.openxmlformats.org/presentationml/2006/main" type="picTx" preserve="1">
+  <p:cSld name="Picture with Caption">
+    <p:spTree>
+      <p:nvGrpSpPr>
+        <p:cNvPr id="1" name=""/>
+        <p:cNvGrpSpPr/>
+        <p:nvPr/>
+      </p:nvGrpSpPr>
+      <p:grpSpPr>
+        <a:xfrm>
+          <a:off x="0" y="0"/>
+          <a:ext cx="0" cy="0"/>
+          <a:chOff x="0" y="0"/>
+          <a:chExt cx="0" cy="0"/>
+        </a:xfrm>
+      </p:grpSpPr>
+      <p:sp>
+        <p:nvSpPr>
+          <p:cNvPr id="2" name="Title 1"/>
+          <p:cNvSpPr>
+            <a:spLocks noGrp="1"/>
+          </p:cNvSpPr>
+          <p:nvPr>
+            <p:ph type="title"/>
+          </p:nvPr>
+        </p:nvSpPr>
+        <p:spPr>
+          <a:xfrm>
+            <a:off x="629841" y="457200"/>
+            <a:ext cx="2949178" cy="1600200"/>
+          </a:xfrm>
+        </p:spPr>
+        <p:txBody>
+          <a:bodyPr anchor="b"/>
+          <a:lstStyle>
+            <a:lvl1pPr>
+              <a:defRPr sz="3200"/>
+            </a:lvl1pPr>
+          </a:lstStyle>
+          <a:p>
+            <a:r>
+              <a:rPr lang="en-US"/>
+              <a:t>Click to edit Master title style</a:t>
+            </a:r>
+            <a:endParaRPr lang="en-US" dirty="0"/>
+          </a:p>
+        </p:txBody>
+      </p:sp>
+      <p:sp>
+        <p:nvSpPr>
+          <p:cNvPr id="3" name="Picture Placeholder 2"/>
+          <p:cNvSpPr>
+            <a:spLocks noGrp="1" noChangeAspect="1"/>
+          </p:cNvSpPr>
+          <p:nvPr>
+            <p:ph type="pic" idx="1"/>
+          </p:nvPr>
+        </p:nvSpPr>
+        <p:spPr>
+          <a:xfrm>
+            <a:off x="3887391" y="987426"/>
+            <a:ext cx="4629150" cy="4873625"/>
+          </a:xfrm>
+        </p:spPr>
+        <p:txBody>
+          <a:bodyPr anchor="t"/>
+          <a:lstStyle>
+            <a:lvl1pPr marL="0" indent="0">
+              <a:buNone/>
+              <a:defRPr sz="3200"/>
+            </a:lvl1pPr>
+            <a:lvl2pPr marL="457200" indent="0">
+              <a:buNone/>
+              <a:defRPr sz="2800"/>
+            </a:lvl2pPr>
+            <a:lvl3pPr marL="914400" indent="0">
+              <a:buNone/>
+              <a:defRPr sz="2400"/>
+            </a:lvl3pPr>
+            <a:lvl4pPr marL="1371600" indent="0">
+              <a:buNone/>
+              <a:defRPr sz="2000"/>
+            </a:lvl4pPr>
+            <a:lvl5pPr marL="1828800" indent="0">
+              <a:buNone/>
+              <a:defRPr sz="2000"/>
+            </a:lvl5pPr>
+            <a:lvl6pPr marL="2286000" indent="0">
+              <a:buNone/>
+              <a:defRPr sz="2000"/>
+            </a:lvl6pPr>
+            <a:lvl7pPr marL="2743200" indent="0">
+              <a:buNone/>
+              <a:defRPr sz="2000"/>
+            </a:lvl7pPr>
+            <a:lvl8pPr marL="3200400" indent="0">
+              <a:buNone/>
+              <a:defRPr sz="2000"/>
+            </a:lvl8pPr>
+            <a:lvl9pPr marL="3657600" indent="0">
+              <a:buNone/>
+              <a:defRPr sz="2000"/>
+            </a:lvl9pPr>
+          </a:lstStyle>
+          <a:p>
+            <a:r>
+              <a:rPr lang="en-US"/>
+              <a:t>Click icon to add picture</a:t>
+            </a:r>
+            <a:endParaRPr lang="en-US" dirty="0"/>
+          </a:p>
+        </p:txBody>
+      </p:sp>
+      <p:sp>
+        <p:nvSpPr>
+          <p:cNvPr id="4" name="Text Placeholder 3"/>
+          <p:cNvSpPr>
+            <a:spLocks noGrp="1"/>
+          </p:cNvSpPr>
+          <p:nvPr>
+            <p:ph type="body" sz="half" idx="2"/>
+          </p:nvPr>
+        </p:nvSpPr>
+        <p:spPr>
+          <a:xfrm>
+            <a:off x="629841" y="2057400"/>
+            <a:ext cx="2949178" cy="3811588"/>
+          </a:xfrm>
+        </p:spPr>
+        <p:txBody>
+          <a:bodyPr/>
+          <a:lstStyle>
+            <a:lvl1pPr marL="0" indent="0">
+              <a:buNone/>
+              <a:defRPr sz="1600"/>
+            </a:lvl1pPr>
+            <a:lvl2pPr marL="457200" indent="0">
+              <a:buNone/>
+              <a:defRPr sz="1400"/>
+            </a:lvl2pPr>
+            <a:lvl3pPr marL="914400" indent="0">
+              <a:buNone/>
+              <a:defRPr sz="1200"/>
+            </a:lvl3pPr>
+            <a:lvl4pPr marL="1371600" indent="0">
+              <a:buNone/>
+              <a:defRPr sz="1000"/>
+            </a:lvl4pPr>
+            <a:lvl5pPr marL="1828800" indent="0">
+              <a:buNone/>
+              <a:defRPr sz="1000"/>
+            </a:lvl5pPr>
+            <a:lvl6pPr marL="2286000" indent="0">
+              <a:buNone/>
+              <a:defRPr sz="1000"/>
+            </a:lvl6pPr>
+            <a:lvl7pPr marL="2743200" indent="0">
+              <a:buNone/>
+              <a:defRPr sz="1000"/>
+            </a:lvl7pPr>
+            <a:lvl8pPr marL="3200400" indent="0">
+              <a:buNone/>
+              <a:defRPr sz="1000"/>
+            </a:lvl8pPr>
+            <a:lvl9pPr marL="3657600" indent="0">
+              <a:buNone/>
+              <a:defRPr sz="1000"/>
+            </a:lvl9pPr>
+          </a:lstStyle>
+          <a:p>
+            <a:pPr lvl="0"/>
+            <a:r>
+              <a:rPr lang="en-US"/>
+              <a:t>Click to edit Master text styles</a:t>
+            </a:r>
+          </a:p>
+        </p:txBody>
+      </p:sp>
+      <p:sp>
+        <p:nvSpPr>
+          <p:cNvPr id="5" name="Date Placeholder 4"/>
+          <p:cNvSpPr>
+            <a:spLocks noGrp="1"/>
+          </p:cNvSpPr>
+          <p:nvPr>
+            <p:ph type="dt" sz="half" idx="10"/>
+          </p:nvPr>
+        </p:nvSpPr>
+        <p:spPr/>
+        <p:txBody>
+          <a:bodyPr/>
+          <a:lstStyle/>
+          <a:p>
+            <a:fld id="{1ED6B14A-890B-41B1-BF8F-0DE335D705D5}" type="datetimeFigureOut">
+              <a:rPr lang="en-US" smtClean="0"/>
+              <a:t>1/13/2022</a:t>
+            </a:fld>
+            <a:endParaRPr lang="en-US"/>
+          </a:p>
+        </p:txBody>
+      </p:sp>
+      <p:sp>
+        <p:nvSpPr>
+          <p:cNvPr id="6" name="Footer Placeholder 5"/>
+          <p:cNvSpPr>
+            <a:spLocks noGrp="1"/>
+          </p:cNvSpPr>
+          <p:nvPr>
+            <p:ph type="ftr" sz="quarter" idx="11"/>
+          </p:nvPr>
+        </p:nvSpPr>
+        <p:spPr/>
+        <p:txBody>
+          <a:bodyPr/>
+          <a:lstStyle/>
+          <a:p>
+            <a:endParaRPr lang="en-US"/>
+          </a:p>
+        </p:txBody>
+      </p:sp>
+      <p:sp>
+        <p:nvSpPr>
+          <p:cNvPr id="7" name="Slide Number Placeholder 6"/>
+          <p:cNvSpPr>
+            <a:spLocks noGrp="1"/>
+          </p:cNvSpPr>
+          <p:nvPr>
+            <p:ph type="sldNum" sz="quarter" idx="12"/>
+          </p:nvPr>
+        </p:nvSpPr>
+        <p:spPr/>
+        <p:txBody>
+          <a:bodyPr/>
+          <a:lstStyle/>
+          <a:p>
+            <a:fld id="{5EDC08A2-3126-4216-80EA-BB3F5D81E7A0}" type="slidenum">
+              <a:rPr lang="en-US" smtClean="0"/>
+              <a:t>‹#›</a:t>
+            </a:fld>
+            <a:endParaRPr lang="en-US"/>
+          </a:p>
+        </p:txBody>
+      </p:sp>
+    </p:spTree>
+    <p:extLst>
+      <p:ext uri="{BB962C8B-B14F-4D97-AF65-F5344CB8AC3E}">
+        <p14:creationId xmlns:p14="http://schemas.microsoft.com/office/powerpoint/2010/main" val="319836383"/>
+      </p:ext>
+    </p:extLst>
+  </p:cSld>
+  <p:clrMapOvr>
+    <a:masterClrMapping/>
+  </p:clrMapOvr>
+</p:sldLayout>
+</file>
+
+<file path=ppt/slideLayouts/slideLayout11.xml><?xml version="1.0" encoding="utf-8"?>
 <p:sldLayout xmlns:a="http://schemas.openxmlformats.org/drawingml/2006/main" xmlns:r="http://schemas.openxmlformats.org/officeDocument/2006/relationships" xmlns:p="http://schemas.openxmlformats.org/presentationml/2006/main" type="vertTx" preserve="1">
   <p:cSld name="Title and Vertical Text">
     <p:spTree>
@@ -477,7 +734,7 @@
           <a:p>
             <a:fld id="{1ED6B14A-890B-41B1-BF8F-0DE335D705D5}" type="datetimeFigureOut">
               <a:rPr lang="en-US" smtClean="0"/>
-              <a:t>7/29/2019</a:t>
+              <a:t>1/13/2022</a:t>
             </a:fld>
             <a:endParaRPr lang="en-US"/>
           </a:p>
@@ -538,7 +795,7 @@
 </p:sldLayout>
 </file>
 
-<file path=ppt/slideLayouts/slideLayout11.xml><?xml version="1.0" encoding="utf-8"?>
+<file path=ppt/slideLayouts/slideLayout12.xml><?xml version="1.0" encoding="utf-8"?>
 <p:sldLayout xmlns:a="http://schemas.openxmlformats.org/drawingml/2006/main" xmlns:r="http://schemas.openxmlformats.org/officeDocument/2006/relationships" xmlns:p="http://schemas.openxmlformats.org/presentationml/2006/main" type="vertTitleAndTx" preserve="1">
   <p:cSld name="Vertical Title and Text">
     <p:spTree>
@@ -657,7 +914,7 @@
           <a:p>
             <a:fld id="{1ED6B14A-890B-41B1-BF8F-0DE335D705D5}" type="datetimeFigureOut">
               <a:rPr lang="en-US" smtClean="0"/>
-              <a:t>7/29/2019</a:t>
+              <a:t>1/13/2022</a:t>
             </a:fld>
             <a:endParaRPr lang="en-US"/>
           </a:p>
@@ -827,7 +1084,7 @@
           <a:p>
             <a:fld id="{1ED6B14A-890B-41B1-BF8F-0DE335D705D5}" type="datetimeFigureOut">
               <a:rPr lang="en-US" smtClean="0"/>
-              <a:t>7/29/2019</a:t>
+              <a:t>1/13/2022</a:t>
             </a:fld>
             <a:endParaRPr lang="en-US"/>
           </a:p>
@@ -889,6 +1146,134 @@
 </file>
 
 <file path=ppt/slideLayouts/slideLayout3.xml><?xml version="1.0" encoding="utf-8"?>
+<p:sldLayout xmlns:a="http://schemas.openxmlformats.org/drawingml/2006/main" xmlns:r="http://schemas.openxmlformats.org/officeDocument/2006/relationships" xmlns:p="http://schemas.openxmlformats.org/presentationml/2006/main" type="obj" preserve="1">
+  <p:cSld name="Title and Chart">
+    <p:spTree>
+      <p:nvGrpSpPr>
+        <p:cNvPr id="1" name=""/>
+        <p:cNvGrpSpPr/>
+        <p:nvPr/>
+      </p:nvGrpSpPr>
+      <p:grpSpPr>
+        <a:xfrm>
+          <a:off x="0" y="0"/>
+          <a:ext cx="0" cy="0"/>
+          <a:chOff x="0" y="0"/>
+          <a:chExt cx="0" cy="0"/>
+        </a:xfrm>
+      </p:grpSpPr>
+      <p:sp>
+        <p:nvSpPr>
+          <p:cNvPr id="2" name="Title 1"/>
+          <p:cNvSpPr>
+            <a:spLocks noGrp="1"/>
+          </p:cNvSpPr>
+          <p:nvPr>
+            <p:ph type="title"/>
+          </p:nvPr>
+        </p:nvSpPr>
+        <p:spPr>
+          <a:xfrm>
+            <a:off x="628650" y="365126"/>
+            <a:ext cx="7886700" cy="548640"/>
+          </a:xfrm>
+        </p:spPr>
+        <p:txBody>
+          <a:bodyPr>
+            <a:normAutofit/>
+          </a:bodyPr>
+          <a:lstStyle>
+            <a:lvl1pPr>
+              <a:defRPr sz="2400">
+                <a:solidFill>
+                  <a:schemeClr val="tx1">
+                    <a:lumMod val="75000"/>
+                    <a:lumOff val="25000"/>
+                  </a:schemeClr>
+                </a:solidFill>
+                <a:latin typeface="+mn-lt"/>
+              </a:defRPr>
+            </a:lvl1pPr>
+          </a:lstStyle>
+          <a:p>
+            <a:r>
+              <a:rPr lang="en-US" dirty="0"/>
+              <a:t>Click to edit Master title style</a:t>
+            </a:r>
+          </a:p>
+        </p:txBody>
+      </p:sp>
+      <p:sp>
+        <p:nvSpPr>
+          <p:cNvPr id="3" name="Content Placeholder 2"/>
+          <p:cNvSpPr>
+            <a:spLocks noGrp="1"/>
+          </p:cNvSpPr>
+          <p:nvPr>
+            <p:ph idx="1"/>
+          </p:nvPr>
+        </p:nvSpPr>
+        <p:spPr>
+          <a:xfrm>
+            <a:off x="628650" y="1005840"/>
+            <a:ext cx="7886700" cy="5486400"/>
+          </a:xfrm>
+        </p:spPr>
+        <p:txBody>
+          <a:bodyPr/>
+          <a:lstStyle/>
+          <a:p>
+            <a:pPr lvl="0"/>
+            <a:r>
+              <a:rPr lang="en-US"/>
+              <a:t>Click to edit Master text styles</a:t>
+            </a:r>
+          </a:p>
+          <a:p>
+            <a:pPr lvl="1"/>
+            <a:r>
+              <a:rPr lang="en-US"/>
+              <a:t>Second level</a:t>
+            </a:r>
+          </a:p>
+          <a:p>
+            <a:pPr lvl="2"/>
+            <a:r>
+              <a:rPr lang="en-US"/>
+              <a:t>Third level</a:t>
+            </a:r>
+          </a:p>
+          <a:p>
+            <a:pPr lvl="3"/>
+            <a:r>
+              <a:rPr lang="en-US"/>
+              <a:t>Fourth level</a:t>
+            </a:r>
+          </a:p>
+          <a:p>
+            <a:pPr lvl="4"/>
+            <a:r>
+              <a:rPr lang="en-US"/>
+              <a:t>Fifth level</a:t>
+            </a:r>
+            <a:endParaRPr lang="en-US" dirty="0"/>
+          </a:p>
+        </p:txBody>
+      </p:sp>
+    </p:spTree>
+    <p:extLst>
+      <p:ext uri="{BB962C8B-B14F-4D97-AF65-F5344CB8AC3E}">
+        <p14:creationId xmlns:p14="http://schemas.microsoft.com/office/powerpoint/2010/main" val="1094251071"/>
+      </p:ext>
+    </p:extLst>
+  </p:cSld>
+  <p:clrMapOvr>
+    <a:masterClrMapping/>
+  </p:clrMapOvr>
+</p:sldLayout>
+</file>
+
+<file path=ppt/slideLayouts/slideLayout4.xml><?xml version="1.0" encoding="utf-8"?>
 <p:sldLayout xmlns:a="http://schemas.openxmlformats.org/drawingml/2006/main" xmlns:r="http://schemas.openxmlformats.org/officeDocument/2006/relationships" xmlns:p="http://schemas.openxmlformats.org/presentationml/2006/main" type="secHead" preserve="1">
   <p:cSld name="Section Header">
     <p:spTree>
@@ -1071,7 +1456,7 @@
           <a:p>
             <a:fld id="{1ED6B14A-890B-41B1-BF8F-0DE335D705D5}" type="datetimeFigureOut">
               <a:rPr lang="en-US" smtClean="0"/>
-              <a:t>7/29/2019</a:t>
+              <a:t>1/13/2022</a:t>
             </a:fld>
             <a:endParaRPr lang="en-US"/>
           </a:p>
@@ -1132,7 +1517,7 @@
 </p:sldLayout>
 </file>
 
-<file path=ppt/slideLayouts/slideLayout4.xml><?xml version="1.0" encoding="utf-8"?>
+<file path=ppt/slideLayouts/slideLayout5.xml><?xml version="1.0" encoding="utf-8"?>
 <p:sldLayout xmlns:a="http://schemas.openxmlformats.org/drawingml/2006/main" xmlns:r="http://schemas.openxmlformats.org/officeDocument/2006/relationships" xmlns:p="http://schemas.openxmlformats.org/presentationml/2006/main" type="twoObj" preserve="1">
   <p:cSld name="Two Content">
     <p:spTree>
@@ -1303,7 +1688,7 @@
           <a:p>
             <a:fld id="{1ED6B14A-890B-41B1-BF8F-0DE335D705D5}" type="datetimeFigureOut">
               <a:rPr lang="en-US" smtClean="0"/>
-              <a:t>7/29/2019</a:t>
+              <a:t>1/13/2022</a:t>
             </a:fld>
             <a:endParaRPr lang="en-US"/>
           </a:p>
@@ -1364,7 +1749,7 @@
 </p:sldLayout>
 </file>
 
-<file path=ppt/slideLayouts/slideLayout5.xml><?xml version="1.0" encoding="utf-8"?>
+<file path=ppt/slideLayouts/slideLayout6.xml><?xml version="1.0" encoding="utf-8"?>
 <p:sldLayout xmlns:a="http://schemas.openxmlformats.org/drawingml/2006/main" xmlns:r="http://schemas.openxmlformats.org/officeDocument/2006/relationships" xmlns:p="http://schemas.openxmlformats.org/presentationml/2006/main" type="twoTxTwoObj" preserve="1">
   <p:cSld name="Comparison">
     <p:spTree>
@@ -1670,7 +2055,7 @@
           <a:p>
             <a:fld id="{1ED6B14A-890B-41B1-BF8F-0DE335D705D5}" type="datetimeFigureOut">
               <a:rPr lang="en-US" smtClean="0"/>
-              <a:t>7/29/2019</a:t>
+              <a:t>1/13/2022</a:t>
             </a:fld>
             <a:endParaRPr lang="en-US"/>
           </a:p>
@@ -1731,7 +2116,7 @@
 </p:sldLayout>
 </file>
 
-<file path=ppt/slideLayouts/slideLayout6.xml><?xml version="1.0" encoding="utf-8"?>
+<file path=ppt/slideLayouts/slideLayout7.xml><?xml version="1.0" encoding="utf-8"?>
 <p:sldLayout xmlns:a="http://schemas.openxmlformats.org/drawingml/2006/main" xmlns:r="http://schemas.openxmlformats.org/officeDocument/2006/relationships" xmlns:p="http://schemas.openxmlformats.org/presentationml/2006/main" type="titleOnly" preserve="1">
   <p:cSld name="Title Only">
     <p:spTree>
@@ -1788,7 +2173,7 @@
           <a:p>
             <a:fld id="{1ED6B14A-890B-41B1-BF8F-0DE335D705D5}" type="datetimeFigureOut">
               <a:rPr lang="en-US" smtClean="0"/>
-              <a:t>7/29/2019</a:t>
+              <a:t>1/13/2022</a:t>
             </a:fld>
             <a:endParaRPr lang="en-US"/>
           </a:p>
@@ -1849,7 +2234,7 @@
 </p:sldLayout>
 </file>
 
-<file path=ppt/slideLayouts/slideLayout7.xml><?xml version="1.0" encoding="utf-8"?>
+<file path=ppt/slideLayouts/slideLayout8.xml><?xml version="1.0" encoding="utf-8"?>
 <p:sldLayout xmlns:a="http://schemas.openxmlformats.org/drawingml/2006/main" xmlns:r="http://schemas.openxmlformats.org/officeDocument/2006/relationships" xmlns:p="http://schemas.openxmlformats.org/presentationml/2006/main" type="blank" preserve="1">
   <p:cSld name="Blank">
     <p:spTree>
@@ -1883,7 +2268,7 @@
           <a:p>
             <a:fld id="{1ED6B14A-890B-41B1-BF8F-0DE335D705D5}" type="datetimeFigureOut">
               <a:rPr lang="en-US" smtClean="0"/>
-              <a:t>7/29/2019</a:t>
+              <a:t>1/13/2022</a:t>
             </a:fld>
             <a:endParaRPr lang="en-US"/>
           </a:p>
@@ -1944,7 +2329,7 @@
 </p:sldLayout>
 </file>
 
-<file path=ppt/slideLayouts/slideLayout8.xml><?xml version="1.0" encoding="utf-8"?>
+<file path=ppt/slideLayouts/slideLayout9.xml><?xml version="1.0" encoding="utf-8"?>
 <p:sldLayout xmlns:a="http://schemas.openxmlformats.org/drawingml/2006/main" xmlns:r="http://schemas.openxmlformats.org/officeDocument/2006/relationships" xmlns:p="http://schemas.openxmlformats.org/presentationml/2006/main" type="objTx" preserve="1">
   <p:cSld name="Content with Caption">
     <p:spTree>
@@ -2160,7 +2545,7 @@
           <a:p>
             <a:fld id="{1ED6B14A-890B-41B1-BF8F-0DE335D705D5}" type="datetimeFigureOut">
               <a:rPr lang="en-US" smtClean="0"/>
-              <a:t>7/29/2019</a:t>
+              <a:t>1/13/2022</a:t>
             </a:fld>
             <a:endParaRPr lang="en-US"/>
           </a:p>
@@ -2212,263 +2597,6 @@
     <p:extLst>
       <p:ext uri="{BB962C8B-B14F-4D97-AF65-F5344CB8AC3E}">
         <p14:creationId xmlns:p14="http://schemas.microsoft.com/office/powerpoint/2010/main" val="4163121089"/>
-      </p:ext>
-    </p:extLst>
-  </p:cSld>
-  <p:clrMapOvr>
-    <a:masterClrMapping/>
-  </p:clrMapOvr>
-</p:sldLayout>
-</file>
-
-<file path=ppt/slideLayouts/slideLayout9.xml><?xml version="1.0" encoding="utf-8"?>
-<p:sldLayout xmlns:a="http://schemas.openxmlformats.org/drawingml/2006/main" xmlns:r="http://schemas.openxmlformats.org/officeDocument/2006/relationships" xmlns:p="http://schemas.openxmlformats.org/presentationml/2006/main" type="picTx" preserve="1">
-  <p:cSld name="Picture with Caption">
-    <p:spTree>
-      <p:nvGrpSpPr>
-        <p:cNvPr id="1" name=""/>
-        <p:cNvGrpSpPr/>
-        <p:nvPr/>
-      </p:nvGrpSpPr>
-      <p:grpSpPr>
-        <a:xfrm>
-          <a:off x="0" y="0"/>
-          <a:ext cx="0" cy="0"/>
-          <a:chOff x="0" y="0"/>
-          <a:chExt cx="0" cy="0"/>
-        </a:xfrm>
-      </p:grpSpPr>
-      <p:sp>
-        <p:nvSpPr>
-          <p:cNvPr id="2" name="Title 1"/>
-          <p:cNvSpPr>
-            <a:spLocks noGrp="1"/>
-          </p:cNvSpPr>
-          <p:nvPr>
-            <p:ph type="title"/>
-          </p:nvPr>
-        </p:nvSpPr>
-        <p:spPr>
-          <a:xfrm>
-            <a:off x="629841" y="457200"/>
-            <a:ext cx="2949178" cy="1600200"/>
-          </a:xfrm>
-        </p:spPr>
-        <p:txBody>
-          <a:bodyPr anchor="b"/>
-          <a:lstStyle>
-            <a:lvl1pPr>
-              <a:defRPr sz="3200"/>
-            </a:lvl1pPr>
-          </a:lstStyle>
-          <a:p>
-            <a:r>
-              <a:rPr lang="en-US"/>
-              <a:t>Click to edit Master title style</a:t>
-            </a:r>
-            <a:endParaRPr lang="en-US" dirty="0"/>
-          </a:p>
-        </p:txBody>
-      </p:sp>
-      <p:sp>
-        <p:nvSpPr>
-          <p:cNvPr id="3" name="Picture Placeholder 2"/>
-          <p:cNvSpPr>
-            <a:spLocks noGrp="1" noChangeAspect="1"/>
-          </p:cNvSpPr>
-          <p:nvPr>
-            <p:ph type="pic" idx="1"/>
-          </p:nvPr>
-        </p:nvSpPr>
-        <p:spPr>
-          <a:xfrm>
-            <a:off x="3887391" y="987426"/>
-            <a:ext cx="4629150" cy="4873625"/>
-          </a:xfrm>
-        </p:spPr>
-        <p:txBody>
-          <a:bodyPr anchor="t"/>
-          <a:lstStyle>
-            <a:lvl1pPr marL="0" indent="0">
-              <a:buNone/>
-              <a:defRPr sz="3200"/>
-            </a:lvl1pPr>
-            <a:lvl2pPr marL="457200" indent="0">
-              <a:buNone/>
-              <a:defRPr sz="2800"/>
-            </a:lvl2pPr>
-            <a:lvl3pPr marL="914400" indent="0">
-              <a:buNone/>
-              <a:defRPr sz="2400"/>
-            </a:lvl3pPr>
-            <a:lvl4pPr marL="1371600" indent="0">
-              <a:buNone/>
-              <a:defRPr sz="2000"/>
-            </a:lvl4pPr>
-            <a:lvl5pPr marL="1828800" indent="0">
-              <a:buNone/>
-              <a:defRPr sz="2000"/>
-            </a:lvl5pPr>
-            <a:lvl6pPr marL="2286000" indent="0">
-              <a:buNone/>
-              <a:defRPr sz="2000"/>
-            </a:lvl6pPr>
-            <a:lvl7pPr marL="2743200" indent="0">
-              <a:buNone/>
-              <a:defRPr sz="2000"/>
-            </a:lvl7pPr>
-            <a:lvl8pPr marL="3200400" indent="0">
-              <a:buNone/>
-              <a:defRPr sz="2000"/>
-            </a:lvl8pPr>
-            <a:lvl9pPr marL="3657600" indent="0">
-              <a:buNone/>
-              <a:defRPr sz="2000"/>
-            </a:lvl9pPr>
-          </a:lstStyle>
-          <a:p>
-            <a:r>
-              <a:rPr lang="en-US"/>
-              <a:t>Click icon to add picture</a:t>
-            </a:r>
-            <a:endParaRPr lang="en-US" dirty="0"/>
-          </a:p>
-        </p:txBody>
-      </p:sp>
-      <p:sp>
-        <p:nvSpPr>
-          <p:cNvPr id="4" name="Text Placeholder 3"/>
-          <p:cNvSpPr>
-            <a:spLocks noGrp="1"/>
-          </p:cNvSpPr>
-          <p:nvPr>
-            <p:ph type="body" sz="half" idx="2"/>
-          </p:nvPr>
-        </p:nvSpPr>
-        <p:spPr>
-          <a:xfrm>
-            <a:off x="629841" y="2057400"/>
-            <a:ext cx="2949178" cy="3811588"/>
-          </a:xfrm>
-        </p:spPr>
-        <p:txBody>
-          <a:bodyPr/>
-          <a:lstStyle>
-            <a:lvl1pPr marL="0" indent="0">
-              <a:buNone/>
-              <a:defRPr sz="1600"/>
-            </a:lvl1pPr>
-            <a:lvl2pPr marL="457200" indent="0">
-              <a:buNone/>
-              <a:defRPr sz="1400"/>
-            </a:lvl2pPr>
-            <a:lvl3pPr marL="914400" indent="0">
-              <a:buNone/>
-              <a:defRPr sz="1200"/>
-            </a:lvl3pPr>
-            <a:lvl4pPr marL="1371600" indent="0">
-              <a:buNone/>
-              <a:defRPr sz="1000"/>
-            </a:lvl4pPr>
-            <a:lvl5pPr marL="1828800" indent="0">
-              <a:buNone/>
-              <a:defRPr sz="1000"/>
-            </a:lvl5pPr>
-            <a:lvl6pPr marL="2286000" indent="0">
-              <a:buNone/>
-              <a:defRPr sz="1000"/>
-            </a:lvl6pPr>
-            <a:lvl7pPr marL="2743200" indent="0">
-              <a:buNone/>
-              <a:defRPr sz="1000"/>
-            </a:lvl7pPr>
-            <a:lvl8pPr marL="3200400" indent="0">
-              <a:buNone/>
-              <a:defRPr sz="1000"/>
-            </a:lvl8pPr>
-            <a:lvl9pPr marL="3657600" indent="0">
-              <a:buNone/>
-              <a:defRPr sz="1000"/>
-            </a:lvl9pPr>
-          </a:lstStyle>
-          <a:p>
-            <a:pPr lvl="0"/>
-            <a:r>
-              <a:rPr lang="en-US"/>
-              <a:t>Click to edit Master text styles</a:t>
-            </a:r>
-          </a:p>
-        </p:txBody>
-      </p:sp>
-      <p:sp>
-        <p:nvSpPr>
-          <p:cNvPr id="5" name="Date Placeholder 4"/>
-          <p:cNvSpPr>
-            <a:spLocks noGrp="1"/>
-          </p:cNvSpPr>
-          <p:nvPr>
-            <p:ph type="dt" sz="half" idx="10"/>
-          </p:nvPr>
-        </p:nvSpPr>
-        <p:spPr/>
-        <p:txBody>
-          <a:bodyPr/>
-          <a:lstStyle/>
-          <a:p>
-            <a:fld id="{1ED6B14A-890B-41B1-BF8F-0DE335D705D5}" type="datetimeFigureOut">
-              <a:rPr lang="en-US" smtClean="0"/>
-              <a:t>7/29/2019</a:t>
-            </a:fld>
-            <a:endParaRPr lang="en-US"/>
-          </a:p>
-        </p:txBody>
-      </p:sp>
-      <p:sp>
-        <p:nvSpPr>
-          <p:cNvPr id="6" name="Footer Placeholder 5"/>
-          <p:cNvSpPr>
-            <a:spLocks noGrp="1"/>
-          </p:cNvSpPr>
-          <p:nvPr>
-            <p:ph type="ftr" sz="quarter" idx="11"/>
-          </p:nvPr>
-        </p:nvSpPr>
-        <p:spPr/>
-        <p:txBody>
-          <a:bodyPr/>
-          <a:lstStyle/>
-          <a:p>
-            <a:endParaRPr lang="en-US"/>
-          </a:p>
-        </p:txBody>
-      </p:sp>
-      <p:sp>
-        <p:nvSpPr>
-          <p:cNvPr id="7" name="Slide Number Placeholder 6"/>
-          <p:cNvSpPr>
-            <a:spLocks noGrp="1"/>
-          </p:cNvSpPr>
-          <p:nvPr>
-            <p:ph type="sldNum" sz="quarter" idx="12"/>
-          </p:nvPr>
-        </p:nvSpPr>
-        <p:spPr/>
-        <p:txBody>
-          <a:bodyPr/>
-          <a:lstStyle/>
-          <a:p>
-            <a:fld id="{5EDC08A2-3126-4216-80EA-BB3F5D81E7A0}" type="slidenum">
-              <a:rPr lang="en-US" smtClean="0"/>
-              <a:t>‹#›</a:t>
-            </a:fld>
-            <a:endParaRPr lang="en-US"/>
-          </a:p>
-        </p:txBody>
-      </p:sp>
-    </p:spTree>
-    <p:extLst>
-      <p:ext uri="{BB962C8B-B14F-4D97-AF65-F5344CB8AC3E}">
-        <p14:creationId xmlns:p14="http://schemas.microsoft.com/office/powerpoint/2010/main" val="319836383"/>
       </p:ext>
     </p:extLst>
   </p:cSld>
@@ -2630,7 +2758,7 @@
           <a:p>
             <a:fld id="{1ED6B14A-890B-41B1-BF8F-0DE335D705D5}" type="datetimeFigureOut">
               <a:rPr lang="en-US" smtClean="0"/>
-              <a:t>7/29/2019</a:t>
+              <a:t>1/13/2022</a:t>
             </a:fld>
             <a:endParaRPr lang="en-US"/>
           </a:p>
@@ -2725,15 +2853,16 @@
   <p:sldLayoutIdLst>
     <p:sldLayoutId id="2147483661" r:id="rId1"/>
     <p:sldLayoutId id="2147483662" r:id="rId2"/>
-    <p:sldLayoutId id="2147483663" r:id="rId3"/>
-    <p:sldLayoutId id="2147483664" r:id="rId4"/>
-    <p:sldLayoutId id="2147483665" r:id="rId5"/>
-    <p:sldLayoutId id="2147483666" r:id="rId6"/>
-    <p:sldLayoutId id="2147483667" r:id="rId7"/>
-    <p:sldLayoutId id="2147483668" r:id="rId8"/>
-    <p:sldLayoutId id="2147483669" r:id="rId9"/>
-    <p:sldLayoutId id="2147483670" r:id="rId10"/>
-    <p:sldLayoutId id="2147483671" r:id="rId11"/>
+    <p:sldLayoutId id="2147483672" r:id="rId3"/>
+    <p:sldLayoutId id="2147483663" r:id="rId4"/>
+    <p:sldLayoutId id="2147483664" r:id="rId5"/>
+    <p:sldLayoutId id="2147483665" r:id="rId6"/>
+    <p:sldLayoutId id="2147483666" r:id="rId7"/>
+    <p:sldLayoutId id="2147483667" r:id="rId8"/>
+    <p:sldLayoutId id="2147483668" r:id="rId9"/>
+    <p:sldLayoutId id="2147483669" r:id="rId10"/>
+    <p:sldLayoutId id="2147483670" r:id="rId11"/>
+    <p:sldLayoutId id="2147483671" r:id="rId12"/>
   </p:sldLayoutIdLst>
   <p:txStyles>
     <p:titleStyle>

</xml_diff>